<commit_message>
Mise à jour présentation
</commit_message>
<xml_diff>
--- a/doc/Présentation.pptx
+++ b/doc/Présentation.pptx
@@ -5,7 +5,7 @@
     <p:sldMasterId id="2147483648" r:id="rId1"/>
   </p:sldMasterIdLst>
   <p:notesMasterIdLst>
-    <p:notesMasterId r:id="rId12"/>
+    <p:notesMasterId r:id="rId14"/>
   </p:notesMasterIdLst>
   <p:sldIdLst>
     <p:sldId id="256" r:id="rId2"/>
@@ -17,7 +17,9 @@
     <p:sldId id="262" r:id="rId8"/>
     <p:sldId id="263" r:id="rId9"/>
     <p:sldId id="264" r:id="rId10"/>
-    <p:sldId id="265" r:id="rId11"/>
+    <p:sldId id="266" r:id="rId11"/>
+    <p:sldId id="267" r:id="rId12"/>
+    <p:sldId id="265" r:id="rId13"/>
   </p:sldIdLst>
   <p:sldSz cx="12192000" cy="6858000"/>
   <p:notesSz cx="6858000" cy="9144000"/>
@@ -130,6 +132,8 @@
             <p14:sldId id="262"/>
             <p14:sldId id="263"/>
             <p14:sldId id="264"/>
+            <p14:sldId id="266"/>
+            <p14:sldId id="267"/>
             <p14:sldId id="265"/>
           </p14:sldIdLst>
         </p14:section>
@@ -228,7 +232,7 @@
           <a:p>
             <a:fld id="{E3D65146-966A-4DA0-8DAA-16D103FC3CE1}" type="datetimeFigureOut">
               <a:rPr lang="fr-FR" smtClean="0"/>
-              <a:t>09/01/2018</a:t>
+              <a:t>02/02/2018</a:t>
             </a:fld>
             <a:endParaRPr lang="fr-FR"/>
           </a:p>
@@ -634,7 +638,7 @@
           <a:p>
             <a:fld id="{0D2594D2-BBE9-4D3B-8355-E5252B3D93AE}" type="datetime1">
               <a:rPr lang="en-US" smtClean="0"/>
-              <a:t>1/9/2018</a:t>
+              <a:t>2/2/2018</a:t>
             </a:fld>
             <a:endParaRPr lang="en-US" dirty="0"/>
           </a:p>
@@ -840,7 +844,7 @@
           <a:p>
             <a:fld id="{91A8EFF2-9A6E-4BD3-9DC0-0CE4680AF9E9}" type="datetime1">
               <a:rPr lang="en-US" smtClean="0"/>
-              <a:t>1/9/2018</a:t>
+              <a:t>2/2/2018</a:t>
             </a:fld>
             <a:endParaRPr lang="en-US" dirty="0"/>
           </a:p>
@@ -1050,7 +1054,7 @@
           <a:p>
             <a:fld id="{40CD5A2F-11EB-4639-B606-CB9DF8CE38FA}" type="datetime1">
               <a:rPr lang="en-US" smtClean="0"/>
-              <a:t>1/9/2018</a:t>
+              <a:t>2/2/2018</a:t>
             </a:fld>
             <a:endParaRPr lang="en-US" dirty="0"/>
           </a:p>
@@ -1246,7 +1250,7 @@
           <a:p>
             <a:fld id="{19323D46-FECF-43FE-AB76-B80A2BC6A153}" type="datetime1">
               <a:rPr lang="en-US" smtClean="0"/>
-              <a:t>1/9/2018</a:t>
+              <a:t>2/2/2018</a:t>
             </a:fld>
             <a:endParaRPr lang="en-US" dirty="0"/>
           </a:p>
@@ -1520,7 +1524,7 @@
           <a:p>
             <a:fld id="{3627FFB0-889E-4C83-9CCF-0DA31BC5F663}" type="datetime1">
               <a:rPr lang="en-US" smtClean="0"/>
-              <a:t>1/9/2018</a:t>
+              <a:t>2/2/2018</a:t>
             </a:fld>
             <a:endParaRPr lang="en-US" dirty="0"/>
           </a:p>
@@ -1783,7 +1787,7 @@
           <a:p>
             <a:fld id="{536AF545-40C6-4885-9CA6-7476DC085E5F}" type="datetime1">
               <a:rPr lang="en-US" smtClean="0"/>
-              <a:t>1/9/2018</a:t>
+              <a:t>2/2/2018</a:t>
             </a:fld>
             <a:endParaRPr lang="en-US" dirty="0"/>
           </a:p>
@@ -2194,7 +2198,7 @@
           <a:p>
             <a:fld id="{46C7327F-B61A-4AAC-AD6E-59B3ADF6CF9B}" type="datetime1">
               <a:rPr lang="en-US" smtClean="0"/>
-              <a:t>1/9/2018</a:t>
+              <a:t>2/2/2018</a:t>
             </a:fld>
             <a:endParaRPr lang="en-US" dirty="0"/>
           </a:p>
@@ -2338,7 +2342,7 @@
           <a:p>
             <a:fld id="{46842B9E-6BAE-46D6-B95E-B5D0975A0C23}" type="datetime1">
               <a:rPr lang="en-US" smtClean="0"/>
-              <a:t>1/9/2018</a:t>
+              <a:t>2/2/2018</a:t>
             </a:fld>
             <a:endParaRPr lang="en-US" dirty="0"/>
           </a:p>
@@ -2459,7 +2463,7 @@
           <a:p>
             <a:fld id="{C2B3A041-8F43-4653-AFFF-11C6FF6BE347}" type="datetime1">
               <a:rPr lang="en-US" smtClean="0"/>
-              <a:t>1/9/2018</a:t>
+              <a:t>2/2/2018</a:t>
             </a:fld>
             <a:endParaRPr lang="en-US" dirty="0"/>
           </a:p>
@@ -2705,7 +2709,7 @@
           <a:p>
             <a:fld id="{B3D96F4E-0FE6-4397-A037-3DA213B06FF7}" type="datetime1">
               <a:rPr lang="en-US" smtClean="0"/>
-              <a:t>1/9/2018</a:t>
+              <a:t>2/2/2018</a:t>
             </a:fld>
             <a:endParaRPr lang="en-US" dirty="0"/>
           </a:p>
@@ -3145,7 +3149,7 @@
           <a:p>
             <a:fld id="{1FD83782-6053-4943-89F4-4101E32A7229}" type="datetime1">
               <a:rPr lang="en-US" smtClean="0"/>
-              <a:t>1/9/2018</a:t>
+              <a:t>2/2/2018</a:t>
             </a:fld>
             <a:endParaRPr lang="en-US" dirty="0"/>
           </a:p>
@@ -3466,7 +3470,7 @@
           <a:p>
             <a:fld id="{28D110B0-09A5-4A87-B9A4-9B47858BC48A}" type="datetime1">
               <a:rPr lang="en-US" smtClean="0"/>
-              <a:t>1/9/2018</a:t>
+              <a:t>2/2/2018</a:t>
             </a:fld>
             <a:endParaRPr lang="en-US" dirty="0"/>
           </a:p>
@@ -4089,6 +4093,859 @@
           <p:cNvPr id="2" name="Titre 1">
             <a:extLst>
               <a:ext uri="{FF2B5EF4-FFF2-40B4-BE49-F238E27FC236}">
+                <a16:creationId xmlns:a16="http://schemas.microsoft.com/office/drawing/2014/main" id="{C71461F8-262B-4A8C-859A-884DC0E9237C}"/>
+              </a:ext>
+            </a:extLst>
+          </p:cNvPr>
+          <p:cNvSpPr>
+            <a:spLocks noGrp="1"/>
+          </p:cNvSpPr>
+          <p:nvPr>
+            <p:ph type="title"/>
+          </p:nvPr>
+        </p:nvSpPr>
+        <p:spPr>
+          <a:xfrm>
+            <a:off x="1451579" y="1391655"/>
+            <a:ext cx="9603275" cy="462099"/>
+          </a:xfrm>
+        </p:spPr>
+        <p:txBody>
+          <a:bodyPr>
+            <a:normAutofit fontScale="90000"/>
+          </a:bodyPr>
+          <a:lstStyle/>
+          <a:p>
+            <a:r>
+              <a:rPr lang="fr-FR" dirty="0"/>
+              <a:t>Pour aller plus loin (utilisation en AR)</a:t>
+            </a:r>
+            <a:br>
+              <a:rPr lang="fr-FR" dirty="0"/>
+            </a:br>
+            <a:endParaRPr lang="fr-FR" dirty="0"/>
+          </a:p>
+        </p:txBody>
+      </p:sp>
+      <p:sp>
+        <p:nvSpPr>
+          <p:cNvPr id="3" name="Espace réservé du contenu 2">
+            <a:extLst>
+              <a:ext uri="{FF2B5EF4-FFF2-40B4-BE49-F238E27FC236}">
+                <a16:creationId xmlns:a16="http://schemas.microsoft.com/office/drawing/2014/main" id="{C6B21707-B7BD-413F-83D8-670279E0CF94}"/>
+              </a:ext>
+            </a:extLst>
+          </p:cNvPr>
+          <p:cNvSpPr>
+            <a:spLocks noGrp="1"/>
+          </p:cNvSpPr>
+          <p:nvPr>
+            <p:ph idx="1"/>
+          </p:nvPr>
+        </p:nvSpPr>
+        <p:spPr/>
+        <p:txBody>
+          <a:bodyPr/>
+          <a:lstStyle/>
+          <a:p>
+            <a:r>
+              <a:rPr lang="fr-FR" dirty="0"/>
+              <a:t>But du projet </a:t>
+            </a:r>
+          </a:p>
+          <a:p>
+            <a:pPr lvl="1"/>
+            <a:r>
+              <a:rPr lang="fr-FR" dirty="0"/>
+              <a:t>Créer une application mettant en situation le calibrage d’une caméra</a:t>
+            </a:r>
+          </a:p>
+          <a:p>
+            <a:pPr lvl="1"/>
+            <a:r>
+              <a:rPr lang="fr-FR" dirty="0"/>
+              <a:t>Dans notre cas on veut pouvoir modifier les hauteurs de la fausse mire en pointant les intersections que l’on veut modifier avec  avec un objet spécifique (il doit avoir une partie jaune)</a:t>
+            </a:r>
+          </a:p>
+          <a:p>
+            <a:endParaRPr lang="fr-FR" dirty="0"/>
+          </a:p>
+        </p:txBody>
+      </p:sp>
+      <p:sp>
+        <p:nvSpPr>
+          <p:cNvPr id="6" name="Espace réservé du numéro de diapositive 3">
+            <a:extLst>
+              <a:ext uri="{FF2B5EF4-FFF2-40B4-BE49-F238E27FC236}">
+                <a16:creationId xmlns:a16="http://schemas.microsoft.com/office/drawing/2014/main" id="{C7AFDDE8-DD4B-4F0F-89C3-6308EC276219}"/>
+              </a:ext>
+            </a:extLst>
+          </p:cNvPr>
+          <p:cNvSpPr txBox="1">
+            <a:spLocks/>
+          </p:cNvSpPr>
+          <p:nvPr/>
+        </p:nvSpPr>
+        <p:spPr>
+          <a:xfrm>
+            <a:off x="11380981" y="5609098"/>
+            <a:ext cx="811019" cy="503578"/>
+          </a:xfrm>
+          <a:prstGeom prst="rect">
+            <a:avLst/>
+          </a:prstGeom>
+        </p:spPr>
+        <p:txBody>
+          <a:bodyPr vert="horz" lIns="91440" tIns="45720" rIns="91440" bIns="45720" rtlCol="0" anchor="t"/>
+          <a:lstStyle>
+            <a:defPPr>
+              <a:defRPr lang="en-US"/>
+            </a:defPPr>
+            <a:lvl1pPr marL="0" algn="r" defTabSz="457200" rtl="0" eaLnBrk="1" latinLnBrk="0" hangingPunct="1">
+              <a:defRPr sz="2800" kern="1200">
+                <a:solidFill>
+                  <a:schemeClr val="accent1"/>
+                </a:solidFill>
+                <a:latin typeface="+mn-lt"/>
+                <a:ea typeface="+mn-ea"/>
+                <a:cs typeface="+mn-cs"/>
+              </a:defRPr>
+            </a:lvl1pPr>
+            <a:lvl2pPr marL="457200" algn="l" defTabSz="457200" rtl="0" eaLnBrk="1" latinLnBrk="0" hangingPunct="1">
+              <a:defRPr sz="1800" kern="1200">
+                <a:solidFill>
+                  <a:schemeClr val="tx1"/>
+                </a:solidFill>
+                <a:latin typeface="+mn-lt"/>
+                <a:ea typeface="+mn-ea"/>
+                <a:cs typeface="+mn-cs"/>
+              </a:defRPr>
+            </a:lvl2pPr>
+            <a:lvl3pPr marL="914400" algn="l" defTabSz="457200" rtl="0" eaLnBrk="1" latinLnBrk="0" hangingPunct="1">
+              <a:defRPr sz="1800" kern="1200">
+                <a:solidFill>
+                  <a:schemeClr val="tx1"/>
+                </a:solidFill>
+                <a:latin typeface="+mn-lt"/>
+                <a:ea typeface="+mn-ea"/>
+                <a:cs typeface="+mn-cs"/>
+              </a:defRPr>
+            </a:lvl3pPr>
+            <a:lvl4pPr marL="1371600" algn="l" defTabSz="457200" rtl="0" eaLnBrk="1" latinLnBrk="0" hangingPunct="1">
+              <a:defRPr sz="1800" kern="1200">
+                <a:solidFill>
+                  <a:schemeClr val="tx1"/>
+                </a:solidFill>
+                <a:latin typeface="+mn-lt"/>
+                <a:ea typeface="+mn-ea"/>
+                <a:cs typeface="+mn-cs"/>
+              </a:defRPr>
+            </a:lvl4pPr>
+            <a:lvl5pPr marL="1828800" algn="l" defTabSz="457200" rtl="0" eaLnBrk="1" latinLnBrk="0" hangingPunct="1">
+              <a:defRPr sz="1800" kern="1200">
+                <a:solidFill>
+                  <a:schemeClr val="tx1"/>
+                </a:solidFill>
+                <a:latin typeface="+mn-lt"/>
+                <a:ea typeface="+mn-ea"/>
+                <a:cs typeface="+mn-cs"/>
+              </a:defRPr>
+            </a:lvl5pPr>
+            <a:lvl6pPr marL="2286000" algn="l" defTabSz="457200" rtl="0" eaLnBrk="1" latinLnBrk="0" hangingPunct="1">
+              <a:defRPr sz="1800" kern="1200">
+                <a:solidFill>
+                  <a:schemeClr val="tx1"/>
+                </a:solidFill>
+                <a:latin typeface="+mn-lt"/>
+                <a:ea typeface="+mn-ea"/>
+                <a:cs typeface="+mn-cs"/>
+              </a:defRPr>
+            </a:lvl6pPr>
+            <a:lvl7pPr marL="2743200" algn="l" defTabSz="457200" rtl="0" eaLnBrk="1" latinLnBrk="0" hangingPunct="1">
+              <a:defRPr sz="1800" kern="1200">
+                <a:solidFill>
+                  <a:schemeClr val="tx1"/>
+                </a:solidFill>
+                <a:latin typeface="+mn-lt"/>
+                <a:ea typeface="+mn-ea"/>
+                <a:cs typeface="+mn-cs"/>
+              </a:defRPr>
+            </a:lvl7pPr>
+            <a:lvl8pPr marL="3200400" algn="l" defTabSz="457200" rtl="0" eaLnBrk="1" latinLnBrk="0" hangingPunct="1">
+              <a:defRPr sz="1800" kern="1200">
+                <a:solidFill>
+                  <a:schemeClr val="tx1"/>
+                </a:solidFill>
+                <a:latin typeface="+mn-lt"/>
+                <a:ea typeface="+mn-ea"/>
+                <a:cs typeface="+mn-cs"/>
+              </a:defRPr>
+            </a:lvl8pPr>
+            <a:lvl9pPr marL="3657600" algn="l" defTabSz="457200" rtl="0" eaLnBrk="1" latinLnBrk="0" hangingPunct="1">
+              <a:defRPr sz="1800" kern="1200">
+                <a:solidFill>
+                  <a:schemeClr val="tx1"/>
+                </a:solidFill>
+                <a:latin typeface="+mn-lt"/>
+                <a:ea typeface="+mn-ea"/>
+                <a:cs typeface="+mn-cs"/>
+              </a:defRPr>
+            </a:lvl9pPr>
+          </a:lstStyle>
+          <a:p>
+            <a:fld id="{6D22F896-40B5-4ADD-8801-0D06FADFA095}" type="slidenum">
+              <a:rPr lang="en-US" smtClean="0"/>
+              <a:pPr/>
+              <a:t>10</a:t>
+            </a:fld>
+            <a:endParaRPr lang="en-US" dirty="0"/>
+          </a:p>
+        </p:txBody>
+      </p:sp>
+    </p:spTree>
+    <p:extLst>
+      <p:ext uri="{BB962C8B-B14F-4D97-AF65-F5344CB8AC3E}">
+        <p14:creationId xmlns:p14="http://schemas.microsoft.com/office/powerpoint/2010/main" val="4199363609"/>
+      </p:ext>
+    </p:extLst>
+  </p:cSld>
+  <p:clrMapOvr>
+    <a:masterClrMapping/>
+  </p:clrMapOvr>
+</p:sld>
+</file>
+
+<file path=ppt/slides/slide11.xml><?xml version="1.0" encoding="utf-8"?>
+<p:sld xmlns:a="http://schemas.openxmlformats.org/drawingml/2006/main" xmlns:r="http://schemas.openxmlformats.org/officeDocument/2006/relationships" xmlns:p="http://schemas.openxmlformats.org/presentationml/2006/main">
+  <p:cSld>
+    <p:spTree>
+      <p:nvGrpSpPr>
+        <p:cNvPr id="1" name=""/>
+        <p:cNvGrpSpPr/>
+        <p:nvPr/>
+      </p:nvGrpSpPr>
+      <p:grpSpPr>
+        <a:xfrm>
+          <a:off x="0" y="0"/>
+          <a:ext cx="0" cy="0"/>
+          <a:chOff x="0" y="0"/>
+          <a:chExt cx="0" cy="0"/>
+        </a:xfrm>
+      </p:grpSpPr>
+      <p:pic>
+        <p:nvPicPr>
+          <p:cNvPr id="2" name="Espace réservé du contenu 1">
+            <a:extLst>
+              <a:ext uri="{FF2B5EF4-FFF2-40B4-BE49-F238E27FC236}">
+                <a16:creationId xmlns:a16="http://schemas.microsoft.com/office/drawing/2014/main" id="{E442E3BC-0AB9-411C-A92A-0F924F9B559E}"/>
+              </a:ext>
+            </a:extLst>
+          </p:cNvPr>
+          <p:cNvPicPr>
+            <a:picLocks noGrp="1" noChangeAspect="1"/>
+          </p:cNvPicPr>
+          <p:nvPr>
+            <p:ph idx="1"/>
+          </p:nvPr>
+        </p:nvPicPr>
+        <p:blipFill>
+          <a:blip r:embed="rId2"/>
+          <a:stretch>
+            <a:fillRect/>
+          </a:stretch>
+        </p:blipFill>
+        <p:spPr>
+          <a:xfrm>
+            <a:off x="515146" y="2915893"/>
+            <a:ext cx="5204542" cy="2401455"/>
+          </a:xfrm>
+          <a:prstGeom prst="rect">
+            <a:avLst/>
+          </a:prstGeom>
+        </p:spPr>
+      </p:pic>
+      <p:sp>
+        <p:nvSpPr>
+          <p:cNvPr id="5" name="Titre 1">
+            <a:extLst>
+              <a:ext uri="{FF2B5EF4-FFF2-40B4-BE49-F238E27FC236}">
+                <a16:creationId xmlns:a16="http://schemas.microsoft.com/office/drawing/2014/main" id="{B8DA9FB0-F817-4C50-B179-AE2D0679F2AF}"/>
+              </a:ext>
+            </a:extLst>
+          </p:cNvPr>
+          <p:cNvSpPr txBox="1">
+            <a:spLocks/>
+          </p:cNvSpPr>
+          <p:nvPr/>
+        </p:nvSpPr>
+        <p:spPr>
+          <a:xfrm>
+            <a:off x="1451579" y="1391655"/>
+            <a:ext cx="9603275" cy="462099"/>
+          </a:xfrm>
+          <a:prstGeom prst="rect">
+            <a:avLst/>
+          </a:prstGeom>
+        </p:spPr>
+        <p:txBody>
+          <a:bodyPr vert="horz" lIns="91440" tIns="45720" rIns="91440" bIns="45720" rtlCol="0" anchor="t">
+            <a:normAutofit fontScale="52500" lnSpcReduction="20000"/>
+          </a:bodyPr>
+          <a:lstStyle>
+            <a:lvl1pPr algn="l" defTabSz="914400" rtl="0" eaLnBrk="1" latinLnBrk="0" hangingPunct="1">
+              <a:lnSpc>
+                <a:spcPct val="90000"/>
+              </a:lnSpc>
+              <a:spcBef>
+                <a:spcPct val="0"/>
+              </a:spcBef>
+              <a:buNone/>
+              <a:defRPr sz="3200" b="0" i="0" kern="1200" cap="all">
+                <a:solidFill>
+                  <a:schemeClr val="tx1"/>
+                </a:solidFill>
+                <a:effectLst/>
+                <a:latin typeface="+mj-lt"/>
+                <a:ea typeface="+mj-ea"/>
+                <a:cs typeface="+mj-cs"/>
+              </a:defRPr>
+            </a:lvl1pPr>
+          </a:lstStyle>
+          <a:p>
+            <a:r>
+              <a:rPr lang="fr-FR"/>
+              <a:t>Pour aller plus loin (utilisation en AR)</a:t>
+            </a:r>
+            <a:br>
+              <a:rPr lang="fr-FR"/>
+            </a:br>
+            <a:endParaRPr lang="fr-FR" dirty="0"/>
+          </a:p>
+        </p:txBody>
+      </p:sp>
+      <p:sp>
+        <p:nvSpPr>
+          <p:cNvPr id="6" name="Espace réservé du numéro de diapositive 3">
+            <a:extLst>
+              <a:ext uri="{FF2B5EF4-FFF2-40B4-BE49-F238E27FC236}">
+                <a16:creationId xmlns:a16="http://schemas.microsoft.com/office/drawing/2014/main" id="{72B58BF9-01AA-4ED6-9D4B-C21AC60D8EDD}"/>
+              </a:ext>
+            </a:extLst>
+          </p:cNvPr>
+          <p:cNvSpPr txBox="1">
+            <a:spLocks/>
+          </p:cNvSpPr>
+          <p:nvPr/>
+        </p:nvSpPr>
+        <p:spPr>
+          <a:xfrm>
+            <a:off x="11380981" y="5609098"/>
+            <a:ext cx="811019" cy="503578"/>
+          </a:xfrm>
+          <a:prstGeom prst="rect">
+            <a:avLst/>
+          </a:prstGeom>
+        </p:spPr>
+        <p:txBody>
+          <a:bodyPr vert="horz" lIns="91440" tIns="45720" rIns="91440" bIns="45720" rtlCol="0" anchor="t"/>
+          <a:lstStyle>
+            <a:defPPr>
+              <a:defRPr lang="en-US"/>
+            </a:defPPr>
+            <a:lvl1pPr marL="0" algn="r" defTabSz="457200" rtl="0" eaLnBrk="1" latinLnBrk="0" hangingPunct="1">
+              <a:defRPr sz="2800" kern="1200">
+                <a:solidFill>
+                  <a:schemeClr val="accent1"/>
+                </a:solidFill>
+                <a:latin typeface="+mn-lt"/>
+                <a:ea typeface="+mn-ea"/>
+                <a:cs typeface="+mn-cs"/>
+              </a:defRPr>
+            </a:lvl1pPr>
+            <a:lvl2pPr marL="457200" algn="l" defTabSz="457200" rtl="0" eaLnBrk="1" latinLnBrk="0" hangingPunct="1">
+              <a:defRPr sz="1800" kern="1200">
+                <a:solidFill>
+                  <a:schemeClr val="tx1"/>
+                </a:solidFill>
+                <a:latin typeface="+mn-lt"/>
+                <a:ea typeface="+mn-ea"/>
+                <a:cs typeface="+mn-cs"/>
+              </a:defRPr>
+            </a:lvl2pPr>
+            <a:lvl3pPr marL="914400" algn="l" defTabSz="457200" rtl="0" eaLnBrk="1" latinLnBrk="0" hangingPunct="1">
+              <a:defRPr sz="1800" kern="1200">
+                <a:solidFill>
+                  <a:schemeClr val="tx1"/>
+                </a:solidFill>
+                <a:latin typeface="+mn-lt"/>
+                <a:ea typeface="+mn-ea"/>
+                <a:cs typeface="+mn-cs"/>
+              </a:defRPr>
+            </a:lvl3pPr>
+            <a:lvl4pPr marL="1371600" algn="l" defTabSz="457200" rtl="0" eaLnBrk="1" latinLnBrk="0" hangingPunct="1">
+              <a:defRPr sz="1800" kern="1200">
+                <a:solidFill>
+                  <a:schemeClr val="tx1"/>
+                </a:solidFill>
+                <a:latin typeface="+mn-lt"/>
+                <a:ea typeface="+mn-ea"/>
+                <a:cs typeface="+mn-cs"/>
+              </a:defRPr>
+            </a:lvl4pPr>
+            <a:lvl5pPr marL="1828800" algn="l" defTabSz="457200" rtl="0" eaLnBrk="1" latinLnBrk="0" hangingPunct="1">
+              <a:defRPr sz="1800" kern="1200">
+                <a:solidFill>
+                  <a:schemeClr val="tx1"/>
+                </a:solidFill>
+                <a:latin typeface="+mn-lt"/>
+                <a:ea typeface="+mn-ea"/>
+                <a:cs typeface="+mn-cs"/>
+              </a:defRPr>
+            </a:lvl5pPr>
+            <a:lvl6pPr marL="2286000" algn="l" defTabSz="457200" rtl="0" eaLnBrk="1" latinLnBrk="0" hangingPunct="1">
+              <a:defRPr sz="1800" kern="1200">
+                <a:solidFill>
+                  <a:schemeClr val="tx1"/>
+                </a:solidFill>
+                <a:latin typeface="+mn-lt"/>
+                <a:ea typeface="+mn-ea"/>
+                <a:cs typeface="+mn-cs"/>
+              </a:defRPr>
+            </a:lvl6pPr>
+            <a:lvl7pPr marL="2743200" algn="l" defTabSz="457200" rtl="0" eaLnBrk="1" latinLnBrk="0" hangingPunct="1">
+              <a:defRPr sz="1800" kern="1200">
+                <a:solidFill>
+                  <a:schemeClr val="tx1"/>
+                </a:solidFill>
+                <a:latin typeface="+mn-lt"/>
+                <a:ea typeface="+mn-ea"/>
+                <a:cs typeface="+mn-cs"/>
+              </a:defRPr>
+            </a:lvl7pPr>
+            <a:lvl8pPr marL="3200400" algn="l" defTabSz="457200" rtl="0" eaLnBrk="1" latinLnBrk="0" hangingPunct="1">
+              <a:defRPr sz="1800" kern="1200">
+                <a:solidFill>
+                  <a:schemeClr val="tx1"/>
+                </a:solidFill>
+                <a:latin typeface="+mn-lt"/>
+                <a:ea typeface="+mn-ea"/>
+                <a:cs typeface="+mn-cs"/>
+              </a:defRPr>
+            </a:lvl8pPr>
+            <a:lvl9pPr marL="3657600" algn="l" defTabSz="457200" rtl="0" eaLnBrk="1" latinLnBrk="0" hangingPunct="1">
+              <a:defRPr sz="1800" kern="1200">
+                <a:solidFill>
+                  <a:schemeClr val="tx1"/>
+                </a:solidFill>
+                <a:latin typeface="+mn-lt"/>
+                <a:ea typeface="+mn-ea"/>
+                <a:cs typeface="+mn-cs"/>
+              </a:defRPr>
+            </a:lvl9pPr>
+          </a:lstStyle>
+          <a:p>
+            <a:fld id="{6D22F896-40B5-4ADD-8801-0D06FADFA095}" type="slidenum">
+              <a:rPr lang="en-US" smtClean="0"/>
+              <a:pPr/>
+              <a:t>11</a:t>
+            </a:fld>
+            <a:endParaRPr lang="en-US" dirty="0"/>
+          </a:p>
+        </p:txBody>
+      </p:sp>
+      <p:pic>
+        <p:nvPicPr>
+          <p:cNvPr id="7" name="Image 6">
+            <a:extLst>
+              <a:ext uri="{FF2B5EF4-FFF2-40B4-BE49-F238E27FC236}">
+                <a16:creationId xmlns:a16="http://schemas.microsoft.com/office/drawing/2014/main" id="{B8B7773C-6A02-4B56-B3FF-C91F9EE5289D}"/>
+              </a:ext>
+            </a:extLst>
+          </p:cNvPr>
+          <p:cNvPicPr>
+            <a:picLocks noChangeAspect="1"/>
+          </p:cNvPicPr>
+          <p:nvPr/>
+        </p:nvPicPr>
+        <p:blipFill>
+          <a:blip r:embed="rId3"/>
+          <a:stretch>
+            <a:fillRect/>
+          </a:stretch>
+        </p:blipFill>
+        <p:spPr>
+          <a:xfrm>
+            <a:off x="5869240" y="2915893"/>
+            <a:ext cx="5638852" cy="2401455"/>
+          </a:xfrm>
+          <a:prstGeom prst="rect">
+            <a:avLst/>
+          </a:prstGeom>
+        </p:spPr>
+      </p:pic>
+      <p:sp>
+        <p:nvSpPr>
+          <p:cNvPr id="8" name="Espace réservé du contenu 2">
+            <a:extLst>
+              <a:ext uri="{FF2B5EF4-FFF2-40B4-BE49-F238E27FC236}">
+                <a16:creationId xmlns:a16="http://schemas.microsoft.com/office/drawing/2014/main" id="{6BFCCC52-141C-4BFE-B7A9-3DA24D980557}"/>
+              </a:ext>
+            </a:extLst>
+          </p:cNvPr>
+          <p:cNvSpPr txBox="1">
+            <a:spLocks/>
+          </p:cNvSpPr>
+          <p:nvPr/>
+        </p:nvSpPr>
+        <p:spPr>
+          <a:xfrm>
+            <a:off x="1451579" y="2015732"/>
+            <a:ext cx="9603275" cy="3450613"/>
+          </a:xfrm>
+          <a:prstGeom prst="rect">
+            <a:avLst/>
+          </a:prstGeom>
+        </p:spPr>
+        <p:txBody>
+          <a:bodyPr vert="horz" lIns="91440" tIns="45720" rIns="91440" bIns="45720" rtlCol="0" anchor="t">
+            <a:normAutofit/>
+          </a:bodyPr>
+          <a:lstStyle>
+            <a:lvl1pPr marL="228600" indent="-228600" algn="l" defTabSz="914400" rtl="0" eaLnBrk="1" latinLnBrk="0" hangingPunct="1">
+              <a:lnSpc>
+                <a:spcPct val="120000"/>
+              </a:lnSpc>
+              <a:spcBef>
+                <a:spcPts val="1000"/>
+              </a:spcBef>
+              <a:buClr>
+                <a:schemeClr val="accent1"/>
+              </a:buClr>
+              <a:buSzPct val="100000"/>
+              <a:buFont typeface="Arial" panose="020B0604020202020204" pitchFamily="34" charset="0"/>
+              <a:buChar char="•"/>
+              <a:defRPr sz="2000" kern="1200">
+                <a:solidFill>
+                  <a:schemeClr val="tx1"/>
+                </a:solidFill>
+                <a:effectLst/>
+                <a:latin typeface="+mn-lt"/>
+                <a:ea typeface="+mn-ea"/>
+                <a:cs typeface="+mn-cs"/>
+              </a:defRPr>
+            </a:lvl1pPr>
+            <a:lvl2pPr marL="685800" indent="-228600" algn="l" defTabSz="914400" rtl="0" eaLnBrk="1" latinLnBrk="0" hangingPunct="1">
+              <a:lnSpc>
+                <a:spcPct val="120000"/>
+              </a:lnSpc>
+              <a:spcBef>
+                <a:spcPts val="500"/>
+              </a:spcBef>
+              <a:buClr>
+                <a:schemeClr val="accent1"/>
+              </a:buClr>
+              <a:buSzPct val="100000"/>
+              <a:buFont typeface="Arial" panose="020B0604020202020204" pitchFamily="34" charset="0"/>
+              <a:buChar char="•"/>
+              <a:defRPr sz="1800" kern="1200" cap="none" baseline="0">
+                <a:solidFill>
+                  <a:schemeClr val="tx1"/>
+                </a:solidFill>
+                <a:effectLst/>
+                <a:latin typeface="+mn-lt"/>
+                <a:ea typeface="+mn-ea"/>
+                <a:cs typeface="+mn-cs"/>
+              </a:defRPr>
+            </a:lvl2pPr>
+            <a:lvl3pPr marL="1143000" indent="-228600" algn="l" defTabSz="914400" rtl="0" eaLnBrk="1" latinLnBrk="0" hangingPunct="1">
+              <a:lnSpc>
+                <a:spcPct val="120000"/>
+              </a:lnSpc>
+              <a:spcBef>
+                <a:spcPts val="500"/>
+              </a:spcBef>
+              <a:buClr>
+                <a:schemeClr val="accent1"/>
+              </a:buClr>
+              <a:buSzPct val="100000"/>
+              <a:buFont typeface="Arial" panose="020B0604020202020204" pitchFamily="34" charset="0"/>
+              <a:buChar char="•"/>
+              <a:defRPr sz="1600" kern="1200">
+                <a:solidFill>
+                  <a:schemeClr val="tx1"/>
+                </a:solidFill>
+                <a:effectLst/>
+                <a:latin typeface="+mn-lt"/>
+                <a:ea typeface="+mn-ea"/>
+                <a:cs typeface="+mn-cs"/>
+              </a:defRPr>
+            </a:lvl3pPr>
+            <a:lvl4pPr marL="1600200" indent="-228600" algn="l" defTabSz="914400" rtl="0" eaLnBrk="1" latinLnBrk="0" hangingPunct="1">
+              <a:lnSpc>
+                <a:spcPct val="120000"/>
+              </a:lnSpc>
+              <a:spcBef>
+                <a:spcPts val="500"/>
+              </a:spcBef>
+              <a:buClr>
+                <a:schemeClr val="accent1"/>
+              </a:buClr>
+              <a:buSzPct val="100000"/>
+              <a:buFont typeface="Arial" panose="020B0604020202020204" pitchFamily="34" charset="0"/>
+              <a:buChar char="•"/>
+              <a:defRPr sz="1400" kern="1200" cap="none" baseline="0">
+                <a:solidFill>
+                  <a:schemeClr val="tx1"/>
+                </a:solidFill>
+                <a:effectLst/>
+                <a:latin typeface="+mn-lt"/>
+                <a:ea typeface="+mn-ea"/>
+                <a:cs typeface="+mn-cs"/>
+              </a:defRPr>
+            </a:lvl4pPr>
+            <a:lvl5pPr marL="2057400" indent="-228600" algn="l" defTabSz="914400" rtl="0" eaLnBrk="1" latinLnBrk="0" hangingPunct="1">
+              <a:lnSpc>
+                <a:spcPct val="120000"/>
+              </a:lnSpc>
+              <a:spcBef>
+                <a:spcPts val="500"/>
+              </a:spcBef>
+              <a:buClr>
+                <a:schemeClr val="accent1"/>
+              </a:buClr>
+              <a:buSzPct val="100000"/>
+              <a:buFont typeface="Arial" panose="020B0604020202020204" pitchFamily="34" charset="0"/>
+              <a:buChar char="•"/>
+              <a:defRPr sz="1200" kern="1200">
+                <a:solidFill>
+                  <a:schemeClr val="tx1"/>
+                </a:solidFill>
+                <a:effectLst/>
+                <a:latin typeface="+mn-lt"/>
+                <a:ea typeface="+mn-ea"/>
+                <a:cs typeface="+mn-cs"/>
+              </a:defRPr>
+            </a:lvl5pPr>
+            <a:lvl6pPr marL="2514600" indent="-228600" algn="l" defTabSz="914400" rtl="0" eaLnBrk="1" latinLnBrk="0" hangingPunct="1">
+              <a:lnSpc>
+                <a:spcPct val="120000"/>
+              </a:lnSpc>
+              <a:spcBef>
+                <a:spcPts val="500"/>
+              </a:spcBef>
+              <a:buClr>
+                <a:schemeClr val="accent1"/>
+              </a:buClr>
+              <a:buSzPct val="100000"/>
+              <a:buFont typeface="Arial" panose="020B0604020202020204" pitchFamily="34" charset="0"/>
+              <a:buChar char="•"/>
+              <a:defRPr sz="1200" kern="1200">
+                <a:solidFill>
+                  <a:schemeClr val="tx1"/>
+                </a:solidFill>
+                <a:effectLst/>
+                <a:latin typeface="+mn-lt"/>
+                <a:ea typeface="+mn-ea"/>
+                <a:cs typeface="+mn-cs"/>
+              </a:defRPr>
+            </a:lvl6pPr>
+            <a:lvl7pPr marL="2971800" indent="-228600" algn="l" defTabSz="914400" rtl="0" eaLnBrk="1" latinLnBrk="0" hangingPunct="1">
+              <a:lnSpc>
+                <a:spcPct val="120000"/>
+              </a:lnSpc>
+              <a:spcBef>
+                <a:spcPts val="500"/>
+              </a:spcBef>
+              <a:buClr>
+                <a:schemeClr val="accent1"/>
+              </a:buClr>
+              <a:buSzPct val="100000"/>
+              <a:buFont typeface="Arial" panose="020B0604020202020204" pitchFamily="34" charset="0"/>
+              <a:buChar char="•"/>
+              <a:defRPr sz="1200" kern="1200">
+                <a:solidFill>
+                  <a:schemeClr val="tx1"/>
+                </a:solidFill>
+                <a:effectLst/>
+                <a:latin typeface="+mn-lt"/>
+                <a:ea typeface="+mn-ea"/>
+                <a:cs typeface="+mn-cs"/>
+              </a:defRPr>
+            </a:lvl7pPr>
+            <a:lvl8pPr marL="3429000" indent="-228600" algn="l" defTabSz="914400" rtl="0" eaLnBrk="1" latinLnBrk="0" hangingPunct="1">
+              <a:lnSpc>
+                <a:spcPct val="120000"/>
+              </a:lnSpc>
+              <a:spcBef>
+                <a:spcPts val="500"/>
+              </a:spcBef>
+              <a:buClr>
+                <a:schemeClr val="accent1"/>
+              </a:buClr>
+              <a:buSzPct val="100000"/>
+              <a:buFont typeface="Arial" panose="020B0604020202020204" pitchFamily="34" charset="0"/>
+              <a:buChar char="•"/>
+              <a:defRPr sz="1200" kern="1200" baseline="0">
+                <a:solidFill>
+                  <a:schemeClr val="tx1"/>
+                </a:solidFill>
+                <a:effectLst/>
+                <a:latin typeface="+mn-lt"/>
+                <a:ea typeface="+mn-ea"/>
+                <a:cs typeface="+mn-cs"/>
+              </a:defRPr>
+            </a:lvl8pPr>
+            <a:lvl9pPr marL="3886200" indent="-228600" algn="l" defTabSz="914400" rtl="0" eaLnBrk="1" latinLnBrk="0" hangingPunct="1">
+              <a:lnSpc>
+                <a:spcPct val="120000"/>
+              </a:lnSpc>
+              <a:spcBef>
+                <a:spcPts val="500"/>
+              </a:spcBef>
+              <a:buClr>
+                <a:schemeClr val="accent1"/>
+              </a:buClr>
+              <a:buSzPct val="100000"/>
+              <a:buFont typeface="Arial" panose="020B0604020202020204" pitchFamily="34" charset="0"/>
+              <a:buChar char="•"/>
+              <a:defRPr sz="1200" kern="1200" baseline="0">
+                <a:solidFill>
+                  <a:schemeClr val="tx1"/>
+                </a:solidFill>
+                <a:effectLst/>
+                <a:latin typeface="+mn-lt"/>
+                <a:ea typeface="+mn-ea"/>
+                <a:cs typeface="+mn-cs"/>
+              </a:defRPr>
+            </a:lvl9pPr>
+          </a:lstStyle>
+          <a:p>
+            <a:r>
+              <a:rPr lang="fr-FR" dirty="0"/>
+              <a:t>Résultats (en chantier : les index des points d’intérêts sont mal reliés avec les vertex permettant de recréer la fausse mire)</a:t>
+            </a:r>
+          </a:p>
+          <a:p>
+            <a:pPr marL="0" indent="0">
+              <a:buNone/>
+            </a:pPr>
+            <a:endParaRPr lang="fr-FR" dirty="0"/>
+          </a:p>
+        </p:txBody>
+      </p:sp>
+      <p:sp>
+        <p:nvSpPr>
+          <p:cNvPr id="9" name="ZoneTexte 8">
+            <a:extLst>
+              <a:ext uri="{FF2B5EF4-FFF2-40B4-BE49-F238E27FC236}">
+                <a16:creationId xmlns:a16="http://schemas.microsoft.com/office/drawing/2014/main" id="{DD6A2325-DC11-4F60-B7B3-893A4DCA6397}"/>
+              </a:ext>
+            </a:extLst>
+          </p:cNvPr>
+          <p:cNvSpPr txBox="1"/>
+          <p:nvPr/>
+        </p:nvSpPr>
+        <p:spPr>
+          <a:xfrm>
+            <a:off x="1137146" y="5319805"/>
+            <a:ext cx="3709798" cy="584775"/>
+          </a:xfrm>
+          <a:prstGeom prst="rect">
+            <a:avLst/>
+          </a:prstGeom>
+          <a:noFill/>
+        </p:spPr>
+        <p:txBody>
+          <a:bodyPr wrap="none" rtlCol="0">
+            <a:spAutoFit/>
+          </a:bodyPr>
+          <a:lstStyle/>
+          <a:p>
+            <a:r>
+              <a:rPr lang="fr-FR" sz="1600" dirty="0"/>
+              <a:t>Figure 5 : détection de la mire et affichage </a:t>
+            </a:r>
+          </a:p>
+          <a:p>
+            <a:pPr algn="ctr"/>
+            <a:r>
+              <a:rPr lang="fr-FR" sz="1600" dirty="0"/>
+              <a:t>de la fausse par dessus</a:t>
+            </a:r>
+          </a:p>
+        </p:txBody>
+      </p:sp>
+      <p:sp>
+        <p:nvSpPr>
+          <p:cNvPr id="10" name="ZoneTexte 9">
+            <a:extLst>
+              <a:ext uri="{FF2B5EF4-FFF2-40B4-BE49-F238E27FC236}">
+                <a16:creationId xmlns:a16="http://schemas.microsoft.com/office/drawing/2014/main" id="{FBD5CA99-E050-4FBB-ACB3-35F1F103B14D}"/>
+              </a:ext>
+            </a:extLst>
+          </p:cNvPr>
+          <p:cNvSpPr txBox="1"/>
+          <p:nvPr/>
+        </p:nvSpPr>
+        <p:spPr>
+          <a:xfrm>
+            <a:off x="6427782" y="5301757"/>
+            <a:ext cx="4627072" cy="584775"/>
+          </a:xfrm>
+          <a:prstGeom prst="rect">
+            <a:avLst/>
+          </a:prstGeom>
+          <a:noFill/>
+        </p:spPr>
+        <p:txBody>
+          <a:bodyPr wrap="square" rtlCol="0">
+            <a:spAutoFit/>
+          </a:bodyPr>
+          <a:lstStyle/>
+          <a:p>
+            <a:pPr algn="ctr"/>
+            <a:r>
+              <a:rPr lang="fr-FR" sz="1600" dirty="0"/>
+              <a:t>Figure 6 : détection de l’objet d’intérêt qui permettra  la modification de la fausse mire</a:t>
+            </a:r>
+          </a:p>
+        </p:txBody>
+      </p:sp>
+    </p:spTree>
+    <p:extLst>
+      <p:ext uri="{BB962C8B-B14F-4D97-AF65-F5344CB8AC3E}">
+        <p14:creationId xmlns:p14="http://schemas.microsoft.com/office/powerpoint/2010/main" val="941366195"/>
+      </p:ext>
+    </p:extLst>
+  </p:cSld>
+  <p:clrMapOvr>
+    <a:masterClrMapping/>
+  </p:clrMapOvr>
+</p:sld>
+</file>
+
+<file path=ppt/slides/slide12.xml><?xml version="1.0" encoding="utf-8"?>
+<p:sld xmlns:a="http://schemas.openxmlformats.org/drawingml/2006/main" xmlns:r="http://schemas.openxmlformats.org/officeDocument/2006/relationships" xmlns:p="http://schemas.openxmlformats.org/presentationml/2006/main">
+  <p:cSld>
+    <p:spTree>
+      <p:nvGrpSpPr>
+        <p:cNvPr id="1" name=""/>
+        <p:cNvGrpSpPr/>
+        <p:nvPr/>
+      </p:nvGrpSpPr>
+      <p:grpSpPr>
+        <a:xfrm>
+          <a:off x="0" y="0"/>
+          <a:ext cx="0" cy="0"/>
+          <a:chOff x="0" y="0"/>
+          <a:chExt cx="0" cy="0"/>
+        </a:xfrm>
+      </p:grpSpPr>
+      <p:sp>
+        <p:nvSpPr>
+          <p:cNvPr id="2" name="Titre 1">
+            <a:extLst>
+              <a:ext uri="{FF2B5EF4-FFF2-40B4-BE49-F238E27FC236}">
                 <a16:creationId xmlns:a16="http://schemas.microsoft.com/office/drawing/2014/main" id="{0246368E-C20E-4410-AAB4-688F4117A329}"/>
               </a:ext>
             </a:extLst>
@@ -4175,7 +5032,7 @@
           <a:p>
             <a:fld id="{6D22F896-40B5-4ADD-8801-0D06FADFA095}" type="slidenum">
               <a:rPr lang="en-US" smtClean="0"/>
-              <a:t>10</a:t>
+              <a:t>12</a:t>
             </a:fld>
             <a:endParaRPr lang="en-US" dirty="0"/>
           </a:p>
@@ -4288,6 +5145,12 @@
             <a:r>
               <a:rPr lang="fr-FR" dirty="0"/>
               <a:t>Cas limites</a:t>
+            </a:r>
+          </a:p>
+          <a:p>
+            <a:r>
+              <a:rPr lang="fr-FR" dirty="0"/>
+              <a:t>Pour aller plus loin (utilisation en AR)</a:t>
             </a:r>
           </a:p>
           <a:p>

</xml_diff>